<commit_message>
add content of js5
</commit_message>
<xml_diff>
--- a/Tour/Web前端技术_布局.pptx
+++ b/Tour/Web前端技术_布局.pptx
@@ -1943,7 +1943,7 @@
           <a:p>
             <a:fld id="{EF6B6D2C-0481-4146-9B6A-279C71BBC68B}" type="datetimeFigureOut">
               <a:rPr lang="zh-CN" altLang="en-US" smtClean="0"/>
-              <a:t>2013/12/5</a:t>
+              <a:t>2014/1/4</a:t>
             </a:fld>
             <a:endParaRPr lang="zh-CN" altLang="en-US"/>
           </a:p>
@@ -2124,7 +2124,7 @@
           <a:p>
             <a:fld id="{EF6B6D2C-0481-4146-9B6A-279C71BBC68B}" type="datetimeFigureOut">
               <a:rPr lang="zh-CN" altLang="en-US" smtClean="0"/>
-              <a:t>2013/12/5</a:t>
+              <a:t>2014/1/4</a:t>
             </a:fld>
             <a:endParaRPr lang="zh-CN" altLang="en-US"/>
           </a:p>
@@ -2275,7 +2275,7 @@
           <a:p>
             <a:fld id="{EF6B6D2C-0481-4146-9B6A-279C71BBC68B}" type="datetimeFigureOut">
               <a:rPr lang="zh-CN" altLang="en-US" smtClean="0"/>
-              <a:t>2013/12/5</a:t>
+              <a:t>2014/1/4</a:t>
             </a:fld>
             <a:endParaRPr lang="zh-CN" altLang="en-US"/>
           </a:p>
@@ -4101,7 +4101,7 @@
           <a:p>
             <a:fld id="{EF6B6D2C-0481-4146-9B6A-279C71BBC68B}" type="datetimeFigureOut">
               <a:rPr lang="zh-CN" altLang="en-US" smtClean="0"/>
-              <a:t>2013/12/5</a:t>
+              <a:t>2014/1/4</a:t>
             </a:fld>
             <a:endParaRPr lang="zh-CN" altLang="en-US"/>
           </a:p>
@@ -5971,7 +5971,7 @@
           <a:p>
             <a:fld id="{EF6B6D2C-0481-4146-9B6A-279C71BBC68B}" type="datetimeFigureOut">
               <a:rPr lang="zh-CN" altLang="en-US" smtClean="0"/>
-              <a:t>2013/12/5</a:t>
+              <a:t>2014/1/4</a:t>
             </a:fld>
             <a:endParaRPr lang="zh-CN" altLang="en-US"/>
           </a:p>
@@ -6084,7 +6084,7 @@
           <a:p>
             <a:fld id="{EF6B6D2C-0481-4146-9B6A-279C71BBC68B}" type="datetimeFigureOut">
               <a:rPr lang="zh-CN" altLang="en-US" smtClean="0"/>
-              <a:t>2013/12/5</a:t>
+              <a:t>2014/1/4</a:t>
             </a:fld>
             <a:endParaRPr lang="zh-CN" altLang="en-US"/>
           </a:p>
@@ -6625,7 +6625,7 @@
           <a:p>
             <a:fld id="{EF6B6D2C-0481-4146-9B6A-279C71BBC68B}" type="datetimeFigureOut">
               <a:rPr lang="zh-CN" altLang="en-US" smtClean="0"/>
-              <a:t>2013/12/5</a:t>
+              <a:t>2014/1/4</a:t>
             </a:fld>
             <a:endParaRPr lang="zh-CN" altLang="en-US"/>
           </a:p>
@@ -6738,7 +6738,7 @@
           <a:p>
             <a:fld id="{EF6B6D2C-0481-4146-9B6A-279C71BBC68B}" type="datetimeFigureOut">
               <a:rPr lang="zh-CN" altLang="en-US" smtClean="0"/>
-              <a:t>2013/12/5</a:t>
+              <a:t>2014/1/4</a:t>
             </a:fld>
             <a:endParaRPr lang="zh-CN" altLang="en-US"/>
           </a:p>
@@ -8449,7 +8449,7 @@
           <a:p>
             <a:fld id="{EF6B6D2C-0481-4146-9B6A-279C71BBC68B}" type="datetimeFigureOut">
               <a:rPr lang="zh-CN" altLang="en-US" smtClean="0"/>
-              <a:t>2013/12/5</a:t>
+              <a:t>2014/1/4</a:t>
             </a:fld>
             <a:endParaRPr lang="zh-CN" altLang="en-US"/>
           </a:p>
@@ -8600,7 +8600,7 @@
           <a:p>
             <a:fld id="{EF6B6D2C-0481-4146-9B6A-279C71BBC68B}" type="datetimeFigureOut">
               <a:rPr lang="zh-CN" altLang="en-US" smtClean="0"/>
-              <a:t>2013/12/5</a:t>
+              <a:t>2014/1/4</a:t>
             </a:fld>
             <a:endParaRPr lang="zh-CN" altLang="en-US"/>
           </a:p>
@@ -12215,7 +12215,7 @@
           <a:p>
             <a:fld id="{EF6B6D2C-0481-4146-9B6A-279C71BBC68B}" type="datetimeFigureOut">
               <a:rPr lang="zh-CN" altLang="en-US" smtClean="0"/>
-              <a:t>2013/12/5</a:t>
+              <a:t>2014/1/4</a:t>
             </a:fld>
             <a:endParaRPr lang="zh-CN" altLang="en-US"/>
           </a:p>
@@ -14074,7 +14074,7 @@
           <a:p>
             <a:fld id="{EF6B6D2C-0481-4146-9B6A-279C71BBC68B}" type="datetimeFigureOut">
               <a:rPr lang="zh-CN" altLang="en-US" smtClean="0"/>
-              <a:t>2013/12/5</a:t>
+              <a:t>2014/1/4</a:t>
             </a:fld>
             <a:endParaRPr lang="zh-CN" altLang="en-US"/>
           </a:p>
@@ -16246,11 +16246,7 @@
           <a:p>
             <a:r>
               <a:rPr lang="zh-CN" altLang="en-US" dirty="0" smtClean="0"/>
-              <a:t>样式表</a:t>
-            </a:r>
-            <a:r>
-              <a:rPr lang="zh-CN" altLang="en-US" dirty="0" smtClean="0"/>
-              <a:t>布局</a:t>
+              <a:t>样式表布局</a:t>
             </a:r>
           </a:p>
           <a:p>
@@ -17118,8 +17114,12 @@
           </a:p>
           <a:p>
             <a:r>
+              <a:rPr lang="zh-CN" altLang="en-US" smtClean="0"/>
+              <a:t>避免</a:t>
+            </a:r>
+            <a:r>
               <a:rPr lang="zh-CN" altLang="en-US" dirty="0" smtClean="0"/>
-              <a:t>能避免绝大多数的排版</a:t>
+              <a:t>绝大多数的排版</a:t>
             </a:r>
             <a:r>
               <a:rPr lang="en-US" altLang="zh-CN" dirty="0" smtClean="0"/>
@@ -17139,7 +17139,11 @@
             </a:r>
             <a:r>
               <a:rPr lang="zh-CN" altLang="en-US" dirty="0" smtClean="0"/>
-              <a:t>的排版行为与标准冲突</a:t>
+              <a:t>的部分排版</a:t>
+            </a:r>
+            <a:r>
+              <a:rPr lang="zh-CN" altLang="en-US" dirty="0" smtClean="0"/>
+              <a:t>行为与标准冲突</a:t>
             </a:r>
             <a:endParaRPr lang="en-US" altLang="zh-CN" dirty="0" smtClean="0"/>
           </a:p>
@@ -17218,7 +17222,26 @@
           <a:p>
             <a:r>
               <a:rPr lang="zh-CN" altLang="en-US" dirty="0" smtClean="0"/>
-              <a:t>简单布局复杂化</a:t>
+              <a:t>使用非</a:t>
+            </a:r>
+            <a:r>
+              <a:rPr lang="en-US" altLang="zh-CN" dirty="0" smtClean="0"/>
+              <a:t>CSS</a:t>
+            </a:r>
+            <a:r>
+              <a:rPr lang="zh-CN" altLang="en-US" dirty="0" smtClean="0"/>
+              <a:t>的方式定义元素的样式</a:t>
+            </a:r>
+            <a:endParaRPr lang="en-US" altLang="zh-CN" dirty="0" smtClean="0"/>
+          </a:p>
+          <a:p>
+            <a:r>
+              <a:rPr lang="zh-CN" altLang="en-US" dirty="0" smtClean="0"/>
+              <a:t>简单</a:t>
+            </a:r>
+            <a:r>
+              <a:rPr lang="zh-CN" altLang="en-US" dirty="0" smtClean="0"/>
+              <a:t>布局复杂化</a:t>
             </a:r>
             <a:endParaRPr lang="en-US" altLang="zh-CN" dirty="0" smtClean="0"/>
           </a:p>
@@ -17332,11 +17355,7 @@
             </a:r>
             <a:r>
               <a:rPr lang="zh-CN" altLang="en-US" dirty="0" smtClean="0"/>
-              <a:t>标记的特性，</a:t>
-            </a:r>
-            <a:r>
-              <a:rPr lang="zh-CN" altLang="en-US" dirty="0" smtClean="0"/>
-              <a:t>把元素摆放在预期的位置上</a:t>
+              <a:t>标记的特性，把元素摆放在预期的位置上</a:t>
             </a:r>
             <a:endParaRPr lang="en-US" altLang="zh-CN" dirty="0" smtClean="0"/>
           </a:p>
@@ -17376,11 +17395,7 @@
             <a:pPr lvl="1"/>
             <a:r>
               <a:rPr lang="zh-CN" altLang="en-US" dirty="0" smtClean="0"/>
-              <a:t>结构层次明确，不需要计算元素尺寸和</a:t>
-            </a:r>
-            <a:r>
-              <a:rPr lang="zh-CN" altLang="en-US" dirty="0" smtClean="0"/>
-              <a:t>定位，可以避免浏览器差异</a:t>
+              <a:t>结构层次明确，不需要计算元素尺寸和定位，可以避免浏览器差异</a:t>
             </a:r>
             <a:endParaRPr lang="en-US" altLang="zh-CN" dirty="0" smtClean="0"/>
           </a:p>
@@ -17395,11 +17410,7 @@
             <a:pPr lvl="1"/>
             <a:r>
               <a:rPr lang="zh-CN" altLang="en-US" dirty="0" smtClean="0"/>
-              <a:t>元素嵌套层次多，布局修改</a:t>
-            </a:r>
-            <a:r>
-              <a:rPr lang="zh-CN" altLang="en-US" dirty="0" smtClean="0"/>
-              <a:t>麻烦，违背了元素原有语义</a:t>
+              <a:t>元素嵌套层次多，布局修改麻烦，违背了元素原有语义</a:t>
             </a:r>
             <a:endParaRPr lang="zh-CN" altLang="en-US" dirty="0"/>
           </a:p>

</xml_diff>